<commit_message>
added page with partial results
</commit_message>
<xml_diff>
--- a/documents/AI Chat Bots.pptx
+++ b/documents/AI Chat Bots.pptx
@@ -12,7 +12,8 @@
     <p:sldId id="259" r:id="rId6"/>
     <p:sldId id="260" r:id="rId7"/>
     <p:sldId id="261" r:id="rId8"/>
-    <p:sldId id="262" r:id="rId9"/>
+    <p:sldId id="264" r:id="rId9"/>
+    <p:sldId id="262" r:id="rId10"/>
   </p:sldIdLst>
   <p:sldSz cx="12192000" cy="6858000"/>
   <p:notesSz cx="6858000" cy="9144000"/>
@@ -266,7 +267,7 @@
           <a:p>
             <a:fld id="{0B145D97-B311-40A5-ABD8-7A6BD9406EAF}" type="datetimeFigureOut">
               <a:rPr lang="en-US" smtClean="0"/>
-              <a:t>12/29/2025</a:t>
+              <a:t>1/1/2026</a:t>
             </a:fld>
             <a:endParaRPr lang="en-US"/>
           </a:p>
@@ -464,7 +465,7 @@
           <a:p>
             <a:fld id="{0B145D97-B311-40A5-ABD8-7A6BD9406EAF}" type="datetimeFigureOut">
               <a:rPr lang="en-US" smtClean="0"/>
-              <a:t>12/29/2025</a:t>
+              <a:t>1/1/2026</a:t>
             </a:fld>
             <a:endParaRPr lang="en-US"/>
           </a:p>
@@ -672,7 +673,7 @@
           <a:p>
             <a:fld id="{0B145D97-B311-40A5-ABD8-7A6BD9406EAF}" type="datetimeFigureOut">
               <a:rPr lang="en-US" smtClean="0"/>
-              <a:t>12/29/2025</a:t>
+              <a:t>1/1/2026</a:t>
             </a:fld>
             <a:endParaRPr lang="en-US"/>
           </a:p>
@@ -870,7 +871,7 @@
           <a:p>
             <a:fld id="{0B145D97-B311-40A5-ABD8-7A6BD9406EAF}" type="datetimeFigureOut">
               <a:rPr lang="en-US" smtClean="0"/>
-              <a:t>12/29/2025</a:t>
+              <a:t>1/1/2026</a:t>
             </a:fld>
             <a:endParaRPr lang="en-US"/>
           </a:p>
@@ -1145,7 +1146,7 @@
           <a:p>
             <a:fld id="{0B145D97-B311-40A5-ABD8-7A6BD9406EAF}" type="datetimeFigureOut">
               <a:rPr lang="en-US" smtClean="0"/>
-              <a:t>12/29/2025</a:t>
+              <a:t>1/1/2026</a:t>
             </a:fld>
             <a:endParaRPr lang="en-US"/>
           </a:p>
@@ -1410,7 +1411,7 @@
           <a:p>
             <a:fld id="{0B145D97-B311-40A5-ABD8-7A6BD9406EAF}" type="datetimeFigureOut">
               <a:rPr lang="en-US" smtClean="0"/>
-              <a:t>12/29/2025</a:t>
+              <a:t>1/1/2026</a:t>
             </a:fld>
             <a:endParaRPr lang="en-US"/>
           </a:p>
@@ -1822,7 +1823,7 @@
           <a:p>
             <a:fld id="{0B145D97-B311-40A5-ABD8-7A6BD9406EAF}" type="datetimeFigureOut">
               <a:rPr lang="en-US" smtClean="0"/>
-              <a:t>12/29/2025</a:t>
+              <a:t>1/1/2026</a:t>
             </a:fld>
             <a:endParaRPr lang="en-US"/>
           </a:p>
@@ -1963,7 +1964,7 @@
           <a:p>
             <a:fld id="{0B145D97-B311-40A5-ABD8-7A6BD9406EAF}" type="datetimeFigureOut">
               <a:rPr lang="en-US" smtClean="0"/>
-              <a:t>12/29/2025</a:t>
+              <a:t>1/1/2026</a:t>
             </a:fld>
             <a:endParaRPr lang="en-US"/>
           </a:p>
@@ -2076,7 +2077,7 @@
           <a:p>
             <a:fld id="{0B145D97-B311-40A5-ABD8-7A6BD9406EAF}" type="datetimeFigureOut">
               <a:rPr lang="en-US" smtClean="0"/>
-              <a:t>12/29/2025</a:t>
+              <a:t>1/1/2026</a:t>
             </a:fld>
             <a:endParaRPr lang="en-US"/>
           </a:p>
@@ -2387,7 +2388,7 @@
           <a:p>
             <a:fld id="{0B145D97-B311-40A5-ABD8-7A6BD9406EAF}" type="datetimeFigureOut">
               <a:rPr lang="en-US" smtClean="0"/>
-              <a:t>12/29/2025</a:t>
+              <a:t>1/1/2026</a:t>
             </a:fld>
             <a:endParaRPr lang="en-US"/>
           </a:p>
@@ -2675,7 +2676,7 @@
           <a:p>
             <a:fld id="{0B145D97-B311-40A5-ABD8-7A6BD9406EAF}" type="datetimeFigureOut">
               <a:rPr lang="en-US" smtClean="0"/>
-              <a:t>12/29/2025</a:t>
+              <a:t>1/1/2026</a:t>
             </a:fld>
             <a:endParaRPr lang="en-US"/>
           </a:p>
@@ -2916,7 +2917,7 @@
           <a:p>
             <a:fld id="{0B145D97-B311-40A5-ABD8-7A6BD9406EAF}" type="datetimeFigureOut">
               <a:rPr lang="en-US" smtClean="0"/>
-              <a:t>12/29/2025</a:t>
+              <a:t>1/1/2026</a:t>
             </a:fld>
             <a:endParaRPr lang="en-US"/>
           </a:p>
@@ -4243,6 +4244,133 @@
 </file>
 
 <file path=ppt/slides/slide8.xml><?xml version="1.0" encoding="utf-8"?>
+<p:sld xmlns:a="http://schemas.openxmlformats.org/drawingml/2006/main" xmlns:r="http://schemas.openxmlformats.org/officeDocument/2006/relationships" xmlns:p="http://schemas.openxmlformats.org/presentationml/2006/main">
+  <p:cSld>
+    <p:spTree>
+      <p:nvGrpSpPr>
+        <p:cNvPr id="1" name=""/>
+        <p:cNvGrpSpPr/>
+        <p:nvPr/>
+      </p:nvGrpSpPr>
+      <p:grpSpPr>
+        <a:xfrm>
+          <a:off x="0" y="0"/>
+          <a:ext cx="0" cy="0"/>
+          <a:chOff x="0" y="0"/>
+          <a:chExt cx="0" cy="0"/>
+        </a:xfrm>
+      </p:grpSpPr>
+      <p:sp>
+        <p:nvSpPr>
+          <p:cNvPr id="4" name="Title 3">
+            <a:extLst>
+              <a:ext uri="{FF2B5EF4-FFF2-40B4-BE49-F238E27FC236}">
+                <a16:creationId xmlns:a16="http://schemas.microsoft.com/office/drawing/2014/main" id="{4F3432B8-6D2C-6893-1F21-45B498491CD8}"/>
+              </a:ext>
+            </a:extLst>
+          </p:cNvPr>
+          <p:cNvSpPr>
+            <a:spLocks noGrp="1"/>
+          </p:cNvSpPr>
+          <p:nvPr>
+            <p:ph type="title"/>
+          </p:nvPr>
+        </p:nvSpPr>
+        <p:spPr>
+          <a:xfrm>
+            <a:off x="838200" y="365125"/>
+            <a:ext cx="10515600" cy="1169761"/>
+          </a:xfrm>
+        </p:spPr>
+        <p:txBody>
+          <a:bodyPr/>
+          <a:lstStyle/>
+          <a:p>
+            <a:r>
+              <a:rPr lang="en-US" dirty="0"/>
+              <a:t>Partial Code and Analysis Results</a:t>
+            </a:r>
+          </a:p>
+        </p:txBody>
+      </p:sp>
+      <p:pic>
+        <p:nvPicPr>
+          <p:cNvPr id="10" name="Content Placeholder 9">
+            <a:extLst>
+              <a:ext uri="{FF2B5EF4-FFF2-40B4-BE49-F238E27FC236}">
+                <a16:creationId xmlns:a16="http://schemas.microsoft.com/office/drawing/2014/main" id="{4F1305DF-901A-F8D0-76F2-7E107BBA9563}"/>
+              </a:ext>
+            </a:extLst>
+          </p:cNvPr>
+          <p:cNvPicPr>
+            <a:picLocks noGrp="1" noChangeAspect="1"/>
+          </p:cNvPicPr>
+          <p:nvPr>
+            <p:ph sz="half" idx="1"/>
+          </p:nvPr>
+        </p:nvPicPr>
+        <p:blipFill>
+          <a:blip r:embed="rId2"/>
+          <a:stretch>
+            <a:fillRect/>
+          </a:stretch>
+        </p:blipFill>
+        <p:spPr>
+          <a:xfrm>
+            <a:off x="1011831" y="1825625"/>
+            <a:ext cx="4834337" cy="4351338"/>
+          </a:xfrm>
+          <a:prstGeom prst="rect">
+            <a:avLst/>
+          </a:prstGeom>
+        </p:spPr>
+      </p:pic>
+      <p:pic>
+        <p:nvPicPr>
+          <p:cNvPr id="12" name="Content Placeholder 11">
+            <a:extLst>
+              <a:ext uri="{FF2B5EF4-FFF2-40B4-BE49-F238E27FC236}">
+                <a16:creationId xmlns:a16="http://schemas.microsoft.com/office/drawing/2014/main" id="{5A249160-A9BE-981D-E5D3-D91B667EC609}"/>
+              </a:ext>
+            </a:extLst>
+          </p:cNvPr>
+          <p:cNvPicPr>
+            <a:picLocks noGrp="1" noChangeAspect="1"/>
+          </p:cNvPicPr>
+          <p:nvPr>
+            <p:ph sz="half" idx="2"/>
+          </p:nvPr>
+        </p:nvPicPr>
+        <p:blipFill>
+          <a:blip r:embed="rId3"/>
+          <a:stretch>
+            <a:fillRect/>
+          </a:stretch>
+        </p:blipFill>
+        <p:spPr>
+          <a:xfrm>
+            <a:off x="6096000" y="1825625"/>
+            <a:ext cx="5181600" cy="1544260"/>
+          </a:xfrm>
+          <a:prstGeom prst="rect">
+            <a:avLst/>
+          </a:prstGeom>
+        </p:spPr>
+      </p:pic>
+    </p:spTree>
+    <p:extLst>
+      <p:ext uri="{BB962C8B-B14F-4D97-AF65-F5344CB8AC3E}">
+        <p14:creationId xmlns:p14="http://schemas.microsoft.com/office/powerpoint/2010/main" val="3519992507"/>
+      </p:ext>
+    </p:extLst>
+  </p:cSld>
+  <p:clrMapOvr>
+    <a:masterClrMapping/>
+  </p:clrMapOvr>
+</p:sld>
+</file>
+
+<file path=ppt/slides/slide9.xml><?xml version="1.0" encoding="utf-8"?>
 <p:sld xmlns:a="http://schemas.openxmlformats.org/drawingml/2006/main" xmlns:r="http://schemas.openxmlformats.org/officeDocument/2006/relationships" xmlns:p="http://schemas.openxmlformats.org/presentationml/2006/main">
   <p:cSld>
     <p:spTree>

</xml_diff>

<commit_message>
small changes to speaker notes
</commit_message>
<xml_diff>
--- a/documents/AI Chat Bots.pptx
+++ b/documents/AI Chat Bots.pptx
@@ -121,6 +121,9 @@
     <p:ext uri="{EFAFB233-063F-42B5-8137-9DF3F51BA10A}">
       <p15:sldGuideLst xmlns:p15="http://schemas.microsoft.com/office/powerpoint/2012/main"/>
     </p:ext>
+    <p:ext uri="{2D200454-40CA-4A62-9FC3-DE9A4176ACB9}">
+      <p15:notesGuideLst xmlns:p15="http://schemas.microsoft.com/office/powerpoint/2012/main"/>
+    </p:ext>
   </p:extLst>
 </p:presentation>
 </file>
@@ -533,15 +536,7 @@
             </a:br>
             <a:r>
               <a:rPr lang="en-US" dirty="0"/>
-              <a:t>Hello and welcome.  Mike and I will talk about using AI chat bots for software</a:t>
-            </a:r>
-            <a:r>
-              <a:rPr lang="en-US" baseline="0" dirty="0"/>
-              <a:t> development</a:t>
-            </a:r>
-            <a:r>
-              <a:rPr lang="en-US" dirty="0"/>
-              <a:t>. </a:t>
+              <a:t>Hello and welcome to the first of three videos about using AI for software development.  In this first video Mike and I will talk about using AI chat bots. </a:t>
             </a:r>
           </a:p>
           <a:p>

</xml_diff>

<commit_message>
added new AI videos
</commit_message>
<xml_diff>
--- a/documents/AI Chat Bots.pptx
+++ b/documents/AI Chat Bots.pptx
@@ -210,7 +210,7 @@
           <a:p>
             <a:fld id="{6023D157-EEDE-449D-AE80-1B38B030D616}" type="datetimeFigureOut">
               <a:rPr lang="en-US" smtClean="0"/>
-              <a:t>1/22/2026</a:t>
+              <a:t>2/20/2026</a:t>
             </a:fld>
             <a:endParaRPr lang="en-US"/>
           </a:p>
@@ -2016,7 +2016,7 @@
           <a:p>
             <a:fld id="{0B145D97-B311-40A5-ABD8-7A6BD9406EAF}" type="datetimeFigureOut">
               <a:rPr lang="en-US" smtClean="0"/>
-              <a:t>1/22/2026</a:t>
+              <a:t>2/20/2026</a:t>
             </a:fld>
             <a:endParaRPr lang="en-US"/>
           </a:p>
@@ -2214,7 +2214,7 @@
           <a:p>
             <a:fld id="{0B145D97-B311-40A5-ABD8-7A6BD9406EAF}" type="datetimeFigureOut">
               <a:rPr lang="en-US" smtClean="0"/>
-              <a:t>1/22/2026</a:t>
+              <a:t>2/20/2026</a:t>
             </a:fld>
             <a:endParaRPr lang="en-US"/>
           </a:p>
@@ -2422,7 +2422,7 @@
           <a:p>
             <a:fld id="{0B145D97-B311-40A5-ABD8-7A6BD9406EAF}" type="datetimeFigureOut">
               <a:rPr lang="en-US" smtClean="0"/>
-              <a:t>1/22/2026</a:t>
+              <a:t>2/20/2026</a:t>
             </a:fld>
             <a:endParaRPr lang="en-US"/>
           </a:p>
@@ -2620,7 +2620,7 @@
           <a:p>
             <a:fld id="{0B145D97-B311-40A5-ABD8-7A6BD9406EAF}" type="datetimeFigureOut">
               <a:rPr lang="en-US" smtClean="0"/>
-              <a:t>1/22/2026</a:t>
+              <a:t>2/20/2026</a:t>
             </a:fld>
             <a:endParaRPr lang="en-US"/>
           </a:p>
@@ -2895,7 +2895,7 @@
           <a:p>
             <a:fld id="{0B145D97-B311-40A5-ABD8-7A6BD9406EAF}" type="datetimeFigureOut">
               <a:rPr lang="en-US" smtClean="0"/>
-              <a:t>1/22/2026</a:t>
+              <a:t>2/20/2026</a:t>
             </a:fld>
             <a:endParaRPr lang="en-US"/>
           </a:p>
@@ -3160,7 +3160,7 @@
           <a:p>
             <a:fld id="{0B145D97-B311-40A5-ABD8-7A6BD9406EAF}" type="datetimeFigureOut">
               <a:rPr lang="en-US" smtClean="0"/>
-              <a:t>1/22/2026</a:t>
+              <a:t>2/20/2026</a:t>
             </a:fld>
             <a:endParaRPr lang="en-US"/>
           </a:p>
@@ -3572,7 +3572,7 @@
           <a:p>
             <a:fld id="{0B145D97-B311-40A5-ABD8-7A6BD9406EAF}" type="datetimeFigureOut">
               <a:rPr lang="en-US" smtClean="0"/>
-              <a:t>1/22/2026</a:t>
+              <a:t>2/20/2026</a:t>
             </a:fld>
             <a:endParaRPr lang="en-US"/>
           </a:p>
@@ -3713,7 +3713,7 @@
           <a:p>
             <a:fld id="{0B145D97-B311-40A5-ABD8-7A6BD9406EAF}" type="datetimeFigureOut">
               <a:rPr lang="en-US" smtClean="0"/>
-              <a:t>1/22/2026</a:t>
+              <a:t>2/20/2026</a:t>
             </a:fld>
             <a:endParaRPr lang="en-US"/>
           </a:p>
@@ -3826,7 +3826,7 @@
           <a:p>
             <a:fld id="{0B145D97-B311-40A5-ABD8-7A6BD9406EAF}" type="datetimeFigureOut">
               <a:rPr lang="en-US" smtClean="0"/>
-              <a:t>1/22/2026</a:t>
+              <a:t>2/20/2026</a:t>
             </a:fld>
             <a:endParaRPr lang="en-US"/>
           </a:p>
@@ -4137,7 +4137,7 @@
           <a:p>
             <a:fld id="{0B145D97-B311-40A5-ABD8-7A6BD9406EAF}" type="datetimeFigureOut">
               <a:rPr lang="en-US" smtClean="0"/>
-              <a:t>1/22/2026</a:t>
+              <a:t>2/20/2026</a:t>
             </a:fld>
             <a:endParaRPr lang="en-US"/>
           </a:p>
@@ -4425,7 +4425,7 @@
           <a:p>
             <a:fld id="{0B145D97-B311-40A5-ABD8-7A6BD9406EAF}" type="datetimeFigureOut">
               <a:rPr lang="en-US" smtClean="0"/>
-              <a:t>1/22/2026</a:t>
+              <a:t>2/20/2026</a:t>
             </a:fld>
             <a:endParaRPr lang="en-US"/>
           </a:p>
@@ -4666,7 +4666,7 @@
           <a:p>
             <a:fld id="{0B145D97-B311-40A5-ABD8-7A6BD9406EAF}" type="datetimeFigureOut">
               <a:rPr lang="en-US" smtClean="0"/>
-              <a:t>1/22/2026</a:t>
+              <a:t>2/20/2026</a:t>
             </a:fld>
             <a:endParaRPr lang="en-US"/>
           </a:p>

</xml_diff>